<commit_message>
Updating the Math Equations and Environment Setup PPT
</commit_message>
<xml_diff>
--- a/modules/2. Python Intro and Math Foundation/Environment Setup.pptx
+++ b/modules/2. Python Intro and Math Foundation/Environment Setup.pptx
@@ -9425,7 +9425,7 @@
                 <a:ea typeface="Arial Unicode MS" pitchFamily="34" charset="-128"/>
                 <a:cs typeface="Arial Unicode MS" pitchFamily="34" charset="-128"/>
               </a:rPr>
-              <a:t>Creating Environment and Installing useful Libs:</a:t>
+              <a:t>Creating Environment and Installing useful libs:</a:t>
             </a:r>
           </a:p>
           <a:p>
@@ -9453,21 +9453,21 @@
                 <a:ea typeface="Arial Unicode MS" pitchFamily="34" charset="-128"/>
                 <a:cs typeface="Arial Unicode MS" pitchFamily="34" charset="-128"/>
               </a:rPr>
-              <a:t> create –n &lt;</a:t>
+              <a:t> create –n </a:t>
             </a:r>
             <a:r>
               <a:rPr lang="en-US" sz="1800" kern="0" dirty="0" err="1">
                 <a:ea typeface="Arial Unicode MS" pitchFamily="34" charset="-128"/>
                 <a:cs typeface="Arial Unicode MS" pitchFamily="34" charset="-128"/>
               </a:rPr>
-              <a:t>env_name</a:t>
+              <a:t>tks</a:t>
             </a:r>
             <a:r>
               <a:rPr lang="en-US" sz="1800" kern="0" dirty="0">
                 <a:ea typeface="Arial Unicode MS" pitchFamily="34" charset="-128"/>
                 <a:cs typeface="Arial Unicode MS" pitchFamily="34" charset="-128"/>
               </a:rPr>
-              <a:t>&gt; python=3.5</a:t>
+              <a:t> python=3.6</a:t>
             </a:r>
           </a:p>
           <a:p>
@@ -9488,22 +9488,19 @@
                 <a:ea typeface="Arial Unicode MS" pitchFamily="34" charset="-128"/>
                 <a:cs typeface="Arial Unicode MS" pitchFamily="34" charset="-128"/>
               </a:rPr>
-              <a:t>activate &lt;</a:t>
+              <a:t>activate </a:t>
             </a:r>
             <a:r>
               <a:rPr lang="en-US" sz="1800" kern="0" dirty="0" err="1">
                 <a:ea typeface="Arial Unicode MS" pitchFamily="34" charset="-128"/>
                 <a:cs typeface="Arial Unicode MS" pitchFamily="34" charset="-128"/>
               </a:rPr>
-              <a:t>env_name</a:t>
-            </a:r>
-            <a:r>
-              <a:rPr lang="en-US" sz="1800" kern="0" dirty="0">
-                <a:ea typeface="Arial Unicode MS" pitchFamily="34" charset="-128"/>
-                <a:cs typeface="Arial Unicode MS" pitchFamily="34" charset="-128"/>
-              </a:rPr>
-              <a:t>&gt;</a:t>
-            </a:r>
+              <a:t>tks</a:t>
+            </a:r>
+            <a:endParaRPr lang="en-US" sz="1800" kern="0" dirty="0">
+              <a:ea typeface="Arial Unicode MS" pitchFamily="34" charset="-128"/>
+              <a:cs typeface="Arial Unicode MS" pitchFamily="34" charset="-128"/>
+            </a:endParaRPr>
           </a:p>
           <a:p>
             <a:pPr marL="285750" lvl="1" indent="-285750" fontAlgn="base">
@@ -9621,36 +9618,6 @@
           </a:p>
         </p:txBody>
       </p:sp>
-      <p:pic>
-        <p:nvPicPr>
-          <p:cNvPr id="3" name="Picture 2">
-            <a:extLst>
-              <a:ext uri="{FF2B5EF4-FFF2-40B4-BE49-F238E27FC236}">
-                <a16:creationId xmlns:a16="http://schemas.microsoft.com/office/drawing/2014/main" id="{07BD4C82-38E8-42C1-98EF-77DB14340A6A}"/>
-              </a:ext>
-            </a:extLst>
-          </p:cNvPr>
-          <p:cNvPicPr>
-            <a:picLocks noChangeAspect="1"/>
-          </p:cNvPicPr>
-          <p:nvPr/>
-        </p:nvPicPr>
-        <p:blipFill>
-          <a:blip r:embed="rId2"/>
-          <a:stretch>
-            <a:fillRect/>
-          </a:stretch>
-        </p:blipFill>
-        <p:spPr>
-          <a:xfrm>
-            <a:off x="5817026" y="595036"/>
-            <a:ext cx="5470201" cy="3085090"/>
-          </a:xfrm>
-          <a:prstGeom prst="rect">
-            <a:avLst/>
-          </a:prstGeom>
-        </p:spPr>
-      </p:pic>
       <p:sp>
         <p:nvSpPr>
           <p:cNvPr id="4" name="TextBox 3">
@@ -9665,7 +9632,7 @@
         </p:nvSpPr>
         <p:spPr>
           <a:xfrm>
-            <a:off x="662609" y="1616765"/>
+            <a:off x="504001" y="1351722"/>
             <a:ext cx="3667671" cy="276999"/>
           </a:xfrm>
           <a:prstGeom prst="rect">
@@ -9723,6 +9690,36 @@
           <p:nvPr/>
         </p:nvPicPr>
         <p:blipFill>
+          <a:blip r:embed="rId2"/>
+          <a:stretch>
+            <a:fillRect/>
+          </a:stretch>
+        </p:blipFill>
+        <p:spPr>
+          <a:xfrm>
+            <a:off x="299796" y="1999495"/>
+            <a:ext cx="5721436" cy="3702900"/>
+          </a:xfrm>
+          <a:prstGeom prst="rect">
+            <a:avLst/>
+          </a:prstGeom>
+        </p:spPr>
+      </p:pic>
+      <p:pic>
+        <p:nvPicPr>
+          <p:cNvPr id="3" name="Picture 2">
+            <a:extLst>
+              <a:ext uri="{FF2B5EF4-FFF2-40B4-BE49-F238E27FC236}">
+                <a16:creationId xmlns:a16="http://schemas.microsoft.com/office/drawing/2014/main" id="{07BD4C82-38E8-42C1-98EF-77DB14340A6A}"/>
+              </a:ext>
+            </a:extLst>
+          </p:cNvPr>
+          <p:cNvPicPr>
+            <a:picLocks noChangeAspect="1"/>
+          </p:cNvPicPr>
+          <p:nvPr/>
+        </p:nvPicPr>
+        <p:blipFill>
           <a:blip r:embed="rId3"/>
           <a:stretch>
             <a:fillRect/>
@@ -9730,14 +9727,64 @@
         </p:blipFill>
         <p:spPr>
           <a:xfrm>
-            <a:off x="572292" y="2271164"/>
-            <a:ext cx="5721436" cy="3702900"/>
+            <a:off x="5817026" y="595036"/>
+            <a:ext cx="5470201" cy="3085090"/>
           </a:xfrm>
           <a:prstGeom prst="rect">
             <a:avLst/>
           </a:prstGeom>
         </p:spPr>
       </p:pic>
+      <p:sp>
+        <p:nvSpPr>
+          <p:cNvPr id="5" name="TextBox 4">
+            <a:extLst>
+              <a:ext uri="{FF2B5EF4-FFF2-40B4-BE49-F238E27FC236}">
+                <a16:creationId xmlns:a16="http://schemas.microsoft.com/office/drawing/2014/main" id="{CBEF640E-A1A2-4EC5-AD34-28372CD78AA9}"/>
+              </a:ext>
+            </a:extLst>
+          </p:cNvPr>
+          <p:cNvSpPr txBox="1"/>
+          <p:nvPr/>
+        </p:nvSpPr>
+        <p:spPr>
+          <a:xfrm>
+            <a:off x="675861" y="6149009"/>
+            <a:ext cx="11079956" cy="276999"/>
+          </a:xfrm>
+          <a:prstGeom prst="rect">
+            <a:avLst/>
+          </a:prstGeom>
+          <a:noFill/>
+        </p:spPr>
+        <p:txBody>
+          <a:bodyPr wrap="none" lIns="0" tIns="0" rIns="0" bIns="0" rtlCol="0">
+            <a:spAutoFit/>
+          </a:bodyPr>
+          <a:lstStyle/>
+          <a:p>
+            <a:pPr fontAlgn="base">
+              <a:spcBef>
+                <a:spcPct val="50000"/>
+              </a:spcBef>
+              <a:spcAft>
+                <a:spcPct val="0"/>
+              </a:spcAft>
+              <a:buClr>
+                <a:srgbClr val="F0AB00"/>
+              </a:buClr>
+              <a:buSzPct val="80000"/>
+            </a:pPr>
+            <a:r>
+              <a:rPr lang="en-US" sz="1800" kern="0" dirty="0">
+                <a:ea typeface="Arial Unicode MS" pitchFamily="34" charset="-128"/>
+                <a:cs typeface="Arial Unicode MS" pitchFamily="34" charset="-128"/>
+              </a:rPr>
+              <a:t>Note: Advised to use the jupyter notebook from the anaconda environment which is installed in previous step</a:t>
+            </a:r>
+          </a:p>
+        </p:txBody>
+      </p:sp>
     </p:spTree>
     <p:extLst>
       <p:ext uri="{BB962C8B-B14F-4D97-AF65-F5344CB8AC3E}">

</xml_diff>